<commit_message>
more changes to implementation strategy
</commit_message>
<xml_diff>
--- a/Team B - Code Green - MidtermPresentation.pptx
+++ b/Team B - Code Green - MidtermPresentation.pptx
@@ -1533,7 +1533,7 @@
           <a:p>
             <a:fld id="{A86D14B5-D6B5-4181-83CD-709C891308F3}" type="datetime1">
               <a:rPr lang="en-US" smtClean="0"/>
-              <a:t>10/8/2017</a:t>
+              <a:t>10/9/2017</a:t>
             </a:fld>
             <a:endParaRPr lang="en-US" dirty="0"/>
           </a:p>
@@ -1885,7 +1885,7 @@
           <a:p>
             <a:fld id="{D5E1A2B0-52B3-4A30-8FEF-FDD96AB0E427}" type="datetime1">
               <a:rPr lang="en-US" smtClean="0"/>
-              <a:t>10/8/2017</a:t>
+              <a:t>10/9/2017</a:t>
             </a:fld>
             <a:endParaRPr lang="en-US" dirty="0"/>
           </a:p>
@@ -2300,7 +2300,7 @@
           <a:p>
             <a:fld id="{764241F5-22A3-4733-A025-028C15D5847E}" type="datetime1">
               <a:rPr lang="en-US" smtClean="0"/>
-              <a:t>10/8/2017</a:t>
+              <a:t>10/9/2017</a:t>
             </a:fld>
             <a:endParaRPr lang="en-US" dirty="0"/>
           </a:p>
@@ -2650,7 +2650,7 @@
           <a:p>
             <a:fld id="{94E7150A-F428-4A23-963E-F054CB37C309}" type="datetime1">
               <a:rPr lang="en-US" smtClean="0"/>
-              <a:t>10/8/2017</a:t>
+              <a:t>10/9/2017</a:t>
             </a:fld>
             <a:endParaRPr lang="en-US" dirty="0"/>
           </a:p>
@@ -2984,7 +2984,7 @@
           <a:p>
             <a:fld id="{20563C6E-748B-42CF-B665-E2F61C1238D6}" type="datetime1">
               <a:rPr lang="en-US" smtClean="0"/>
-              <a:t>10/8/2017</a:t>
+              <a:t>10/9/2017</a:t>
             </a:fld>
             <a:endParaRPr lang="en-US" dirty="0"/>
           </a:p>
@@ -3394,7 +3394,7 @@
           <a:p>
             <a:fld id="{9FC38171-4E96-4B7F-86D2-C883AA8F0FFB}" type="datetime1">
               <a:rPr lang="en-US" smtClean="0"/>
-              <a:t>10/8/2017</a:t>
+              <a:t>10/9/2017</a:t>
             </a:fld>
             <a:endParaRPr lang="en-US" dirty="0"/>
           </a:p>
@@ -3665,7 +3665,7 @@
           <a:p>
             <a:fld id="{C9B84BC4-5094-4226-B51C-B3616096189D}" type="datetime1">
               <a:rPr lang="en-US" smtClean="0"/>
-              <a:t>10/8/2017</a:t>
+              <a:t>10/9/2017</a:t>
             </a:fld>
             <a:endParaRPr lang="en-US" dirty="0"/>
           </a:p>
@@ -3941,7 +3941,7 @@
           <a:p>
             <a:fld id="{DCB2C317-E5F4-4777-A940-02E3A9A6DB86}" type="datetime1">
               <a:rPr lang="en-US" smtClean="0"/>
-              <a:t>10/8/2017</a:t>
+              <a:t>10/9/2017</a:t>
             </a:fld>
             <a:endParaRPr lang="en-US" dirty="0"/>
           </a:p>
@@ -4450,7 +4450,7 @@
           <a:p>
             <a:fld id="{BD0F08CF-8349-4D2E-B81F-52338022C962}" type="datetime1">
               <a:rPr lang="en-US" smtClean="0"/>
-              <a:t>10/8/2017</a:t>
+              <a:t>10/9/2017</a:t>
             </a:fld>
             <a:endParaRPr lang="en-US" dirty="0"/>
           </a:p>
@@ -4793,7 +4793,7 @@
           <a:p>
             <a:fld id="{172C4749-C08D-485C-999E-C872B2E793C5}" type="datetime1">
               <a:rPr lang="en-US" smtClean="0"/>
-              <a:t>10/8/2017</a:t>
+              <a:t>10/9/2017</a:t>
             </a:fld>
             <a:endParaRPr lang="en-US" dirty="0"/>
           </a:p>
@@ -5130,7 +5130,7 @@
           <a:p>
             <a:fld id="{EC459C39-C404-4328-887C-B0DBFAF37BC3}" type="datetime1">
               <a:rPr lang="en-US" smtClean="0"/>
-              <a:t>10/8/2017</a:t>
+              <a:t>10/9/2017</a:t>
             </a:fld>
             <a:endParaRPr lang="en-US" dirty="0"/>
           </a:p>
@@ -5601,7 +5601,7 @@
           <a:p>
             <a:fld id="{AC9883BC-D3F0-4D03-B040-E858D8A74D3B}" type="datetime1">
               <a:rPr lang="en-US" smtClean="0"/>
-              <a:t>10/8/2017</a:t>
+              <a:t>10/9/2017</a:t>
             </a:fld>
             <a:endParaRPr lang="en-US" dirty="0"/>
           </a:p>
@@ -5820,7 +5820,7 @@
           <a:p>
             <a:fld id="{D329C594-3B73-46FB-812B-AC0109C3993A}" type="datetime1">
               <a:rPr lang="en-US" smtClean="0"/>
-              <a:t>10/8/2017</a:t>
+              <a:t>10/9/2017</a:t>
             </a:fld>
             <a:endParaRPr lang="en-US" dirty="0"/>
           </a:p>
@@ -6011,7 +6011,7 @@
           <a:p>
             <a:fld id="{F8ED311A-4759-4DF5-BC04-B9647693FCA0}" type="datetime1">
               <a:rPr lang="en-US" smtClean="0"/>
-              <a:t>10/8/2017</a:t>
+              <a:t>10/9/2017</a:t>
             </a:fld>
             <a:endParaRPr lang="en-US" dirty="0"/>
           </a:p>
@@ -6350,7 +6350,7 @@
           <a:p>
             <a:fld id="{74BF47E3-0420-4D61-9336-80DEA03E5DDA}" type="datetime1">
               <a:rPr lang="en-US" smtClean="0"/>
-              <a:t>10/8/2017</a:t>
+              <a:t>10/9/2017</a:t>
             </a:fld>
             <a:endParaRPr lang="en-US" dirty="0"/>
           </a:p>
@@ -6709,7 +6709,7 @@
           <a:p>
             <a:fld id="{6E5312DF-44D9-44E1-B876-6EFA776C69C9}" type="datetime1">
               <a:rPr lang="en-US" smtClean="0"/>
-              <a:t>10/8/2017</a:t>
+              <a:t>10/9/2017</a:t>
             </a:fld>
             <a:endParaRPr lang="en-US" dirty="0"/>
           </a:p>
@@ -8840,7 +8840,7 @@
           <a:p>
             <a:fld id="{1F6DBF66-7432-4788-BBC7-0334E961401F}" type="datetime1">
               <a:rPr lang="en-US" smtClean="0"/>
-              <a:t>10/8/2017</a:t>
+              <a:t>10/9/2017</a:t>
             </a:fld>
             <a:endParaRPr lang="en-US" dirty="0"/>
           </a:p>
@@ -10162,137 +10162,6 @@
       </p:sp>
       <p:sp>
         <p:nvSpPr>
-          <p:cNvPr id="117" name="Shape 117"/>
-          <p:cNvSpPr txBox="1">
-            <a:spLocks noGrp="1"/>
-          </p:cNvSpPr>
-          <p:nvPr>
-            <p:ph type="body" idx="1"/>
-          </p:nvPr>
-        </p:nvSpPr>
-        <p:spPr>
-          <a:xfrm>
-            <a:off x="1767154" y="1448655"/>
-            <a:ext cx="7065145" cy="3120219"/>
-          </a:xfrm>
-          <a:prstGeom prst="rect">
-            <a:avLst/>
-          </a:prstGeom>
-        </p:spPr>
-        <p:txBody>
-          <a:bodyPr lIns="91425" tIns="91425" rIns="91425" bIns="91425" anchor="t" anchorCtr="0">
-            <a:noAutofit/>
-          </a:bodyPr>
-          <a:lstStyle/>
-          <a:p>
-            <a:pPr>
-              <a:buFont typeface="Wingdings" panose="05000000000000000000" pitchFamily="2" charset="2"/>
-              <a:buChar char="Ø"/>
-            </a:pPr>
-            <a:r>
-              <a:rPr lang="en" sz="2000" dirty="0" smtClean="0">
-                <a:latin typeface="Times New Roman" panose="02020603050405020304" pitchFamily="18" charset="0"/>
-                <a:cs typeface="Times New Roman" panose="02020603050405020304" pitchFamily="18" charset="0"/>
-              </a:rPr>
-              <a:t>Completing </a:t>
-            </a:r>
-            <a:r>
-              <a:rPr lang="en" sz="2000" dirty="0">
-                <a:latin typeface="Times New Roman" panose="02020603050405020304" pitchFamily="18" charset="0"/>
-                <a:cs typeface="Times New Roman" panose="02020603050405020304" pitchFamily="18" charset="0"/>
-              </a:rPr>
-              <a:t>the Unit Tests after completion of every functionality which makes us easier to move forward</a:t>
-            </a:r>
-            <a:r>
-              <a:rPr lang="en" sz="2000" dirty="0" smtClean="0">
-                <a:latin typeface="Times New Roman" panose="02020603050405020304" pitchFamily="18" charset="0"/>
-                <a:cs typeface="Times New Roman" panose="02020603050405020304" pitchFamily="18" charset="0"/>
-              </a:rPr>
-              <a:t>.</a:t>
-            </a:r>
-          </a:p>
-          <a:p>
-            <a:pPr>
-              <a:buFont typeface="Wingdings" panose="05000000000000000000" pitchFamily="2" charset="2"/>
-              <a:buChar char="Ø"/>
-            </a:pPr>
-            <a:endParaRPr lang="en" sz="2000" dirty="0" smtClean="0">
-              <a:latin typeface="Times New Roman" panose="02020603050405020304" pitchFamily="18" charset="0"/>
-              <a:cs typeface="Times New Roman" panose="02020603050405020304" pitchFamily="18" charset="0"/>
-            </a:endParaRPr>
-          </a:p>
-          <a:p>
-            <a:pPr>
-              <a:buFont typeface="Wingdings" panose="05000000000000000000" pitchFamily="2" charset="2"/>
-              <a:buChar char="Ø"/>
-            </a:pPr>
-            <a:r>
-              <a:rPr lang="en" sz="2000" dirty="0" smtClean="0">
-                <a:latin typeface="Times New Roman" panose="02020603050405020304" pitchFamily="18" charset="0"/>
-                <a:cs typeface="Times New Roman" panose="02020603050405020304" pitchFamily="18" charset="0"/>
-              </a:rPr>
-              <a:t>Developing </a:t>
-            </a:r>
-            <a:r>
-              <a:rPr lang="en" sz="2000" dirty="0">
-                <a:latin typeface="Times New Roman" panose="02020603050405020304" pitchFamily="18" charset="0"/>
-                <a:cs typeface="Times New Roman" panose="02020603050405020304" pitchFamily="18" charset="0"/>
-              </a:rPr>
-              <a:t>the project according to the </a:t>
-            </a:r>
-            <a:r>
-              <a:rPr lang="en" sz="2000" dirty="0" smtClean="0">
-                <a:latin typeface="Times New Roman" panose="02020603050405020304" pitchFamily="18" charset="0"/>
-                <a:cs typeface="Times New Roman" panose="02020603050405020304" pitchFamily="18" charset="0"/>
-              </a:rPr>
-              <a:t>Iteration plan.</a:t>
-            </a:r>
-            <a:endParaRPr lang="en" sz="2000" dirty="0">
-              <a:latin typeface="Times New Roman" panose="02020603050405020304" pitchFamily="18" charset="0"/>
-              <a:cs typeface="Times New Roman" panose="02020603050405020304" pitchFamily="18" charset="0"/>
-            </a:endParaRPr>
-          </a:p>
-          <a:p>
-            <a:endParaRPr lang="en" sz="2000" dirty="0">
-              <a:latin typeface="Times New Roman" panose="02020603050405020304" pitchFamily="18" charset="0"/>
-              <a:cs typeface="Times New Roman" panose="02020603050405020304" pitchFamily="18" charset="0"/>
-            </a:endParaRPr>
-          </a:p>
-          <a:p>
-            <a:endParaRPr sz="2000" dirty="0"/>
-          </a:p>
-        </p:txBody>
-      </p:sp>
-      <p:pic>
-        <p:nvPicPr>
-          <p:cNvPr id="118" name="Shape 118"/>
-          <p:cNvPicPr preferRelativeResize="0"/>
-          <p:nvPr/>
-        </p:nvPicPr>
-        <p:blipFill>
-          <a:blip r:embed="rId3">
-            <a:alphaModFix/>
-          </a:blip>
-          <a:stretch>
-            <a:fillRect/>
-          </a:stretch>
-        </p:blipFill>
-        <p:spPr>
-          <a:xfrm>
-            <a:off x="1767154" y="2929580"/>
-            <a:ext cx="6412180" cy="2070224"/>
-          </a:xfrm>
-          <a:prstGeom prst="rect">
-            <a:avLst/>
-          </a:prstGeom>
-          <a:noFill/>
-          <a:ln>
-            <a:noFill/>
-          </a:ln>
-        </p:spPr>
-      </p:pic>
-      <p:sp>
-        <p:nvSpPr>
           <p:cNvPr id="2" name="Slide Number Placeholder 1"/>
           <p:cNvSpPr>
             <a:spLocks noGrp="1"/>
@@ -10325,6 +10194,433 @@
                 <a:srgbClr val="FF0000"/>
               </a:solidFill>
             </a:endParaRPr>
+          </a:p>
+        </p:txBody>
+      </p:sp>
+      <p:sp>
+        <p:nvSpPr>
+          <p:cNvPr id="3" name="Right Arrow 2"/>
+          <p:cNvSpPr/>
+          <p:nvPr/>
+        </p:nvSpPr>
+        <p:spPr>
+          <a:xfrm>
+            <a:off x="676935" y="1218858"/>
+            <a:ext cx="1786759" cy="956441"/>
+          </a:xfrm>
+          <a:prstGeom prst="rightArrow">
+            <a:avLst/>
+          </a:prstGeom>
+        </p:spPr>
+        <p:style>
+          <a:lnRef idx="3">
+            <a:schemeClr val="lt1"/>
+          </a:lnRef>
+          <a:fillRef idx="1">
+            <a:schemeClr val="dk1"/>
+          </a:fillRef>
+          <a:effectRef idx="1">
+            <a:schemeClr val="dk1"/>
+          </a:effectRef>
+          <a:fontRef idx="minor">
+            <a:schemeClr val="lt1"/>
+          </a:fontRef>
+        </p:style>
+        <p:txBody>
+          <a:bodyPr rtlCol="0" anchor="ctr"/>
+          <a:lstStyle/>
+          <a:p>
+            <a:pPr algn="ctr"/>
+            <a:r>
+              <a:rPr lang="en-US" dirty="0" smtClean="0"/>
+              <a:t>Build Zero </a:t>
+            </a:r>
+            <a:endParaRPr lang="en-US" dirty="0"/>
+          </a:p>
+        </p:txBody>
+      </p:sp>
+      <p:sp>
+        <p:nvSpPr>
+          <p:cNvPr id="7" name="Right Arrow 6"/>
+          <p:cNvSpPr/>
+          <p:nvPr/>
+        </p:nvSpPr>
+        <p:spPr>
+          <a:xfrm>
+            <a:off x="2677510" y="1738573"/>
+            <a:ext cx="1786759" cy="956441"/>
+          </a:xfrm>
+          <a:prstGeom prst="rightArrow">
+            <a:avLst/>
+          </a:prstGeom>
+        </p:spPr>
+        <p:style>
+          <a:lnRef idx="3">
+            <a:schemeClr val="lt1"/>
+          </a:lnRef>
+          <a:fillRef idx="1">
+            <a:schemeClr val="dk1"/>
+          </a:fillRef>
+          <a:effectRef idx="1">
+            <a:schemeClr val="dk1"/>
+          </a:effectRef>
+          <a:fontRef idx="minor">
+            <a:schemeClr val="lt1"/>
+          </a:fontRef>
+        </p:style>
+        <p:txBody>
+          <a:bodyPr rtlCol="0" anchor="ctr"/>
+          <a:lstStyle/>
+          <a:p>
+            <a:pPr algn="ctr"/>
+            <a:r>
+              <a:rPr lang="en-US" dirty="0" smtClean="0"/>
+              <a:t>Build One</a:t>
+            </a:r>
+            <a:endParaRPr lang="en-US" dirty="0"/>
+          </a:p>
+        </p:txBody>
+      </p:sp>
+      <p:sp>
+        <p:nvSpPr>
+          <p:cNvPr id="8" name="Right Arrow 7"/>
+          <p:cNvSpPr/>
+          <p:nvPr/>
+        </p:nvSpPr>
+        <p:spPr>
+          <a:xfrm>
+            <a:off x="5374071" y="2756890"/>
+            <a:ext cx="1786759" cy="956441"/>
+          </a:xfrm>
+          <a:prstGeom prst="rightArrow">
+            <a:avLst/>
+          </a:prstGeom>
+        </p:spPr>
+        <p:style>
+          <a:lnRef idx="3">
+            <a:schemeClr val="lt1"/>
+          </a:lnRef>
+          <a:fillRef idx="1">
+            <a:schemeClr val="dk1"/>
+          </a:fillRef>
+          <a:effectRef idx="1">
+            <a:schemeClr val="dk1"/>
+          </a:effectRef>
+          <a:fontRef idx="minor">
+            <a:schemeClr val="lt1"/>
+          </a:fontRef>
+        </p:style>
+        <p:txBody>
+          <a:bodyPr rtlCol="0" anchor="ctr"/>
+          <a:lstStyle/>
+          <a:p>
+            <a:pPr algn="ctr"/>
+            <a:r>
+              <a:rPr lang="en-US" dirty="0" smtClean="0"/>
+              <a:t>Build Two</a:t>
+            </a:r>
+            <a:endParaRPr lang="en-US" dirty="0"/>
+          </a:p>
+        </p:txBody>
+      </p:sp>
+      <p:sp>
+        <p:nvSpPr>
+          <p:cNvPr id="9" name="Right Arrow 8"/>
+          <p:cNvSpPr/>
+          <p:nvPr/>
+        </p:nvSpPr>
+        <p:spPr>
+          <a:xfrm>
+            <a:off x="7024356" y="3577982"/>
+            <a:ext cx="1786759" cy="956441"/>
+          </a:xfrm>
+          <a:prstGeom prst="rightArrow">
+            <a:avLst/>
+          </a:prstGeom>
+        </p:spPr>
+        <p:style>
+          <a:lnRef idx="3">
+            <a:schemeClr val="lt1"/>
+          </a:lnRef>
+          <a:fillRef idx="1">
+            <a:schemeClr val="dk1"/>
+          </a:fillRef>
+          <a:effectRef idx="1">
+            <a:schemeClr val="dk1"/>
+          </a:effectRef>
+          <a:fontRef idx="minor">
+            <a:schemeClr val="lt1"/>
+          </a:fontRef>
+        </p:style>
+        <p:txBody>
+          <a:bodyPr rtlCol="0" anchor="ctr"/>
+          <a:lstStyle/>
+          <a:p>
+            <a:pPr algn="ctr"/>
+            <a:r>
+              <a:rPr lang="en-US" dirty="0" smtClean="0"/>
+              <a:t>Build Three</a:t>
+            </a:r>
+            <a:endParaRPr lang="en-US" dirty="0"/>
+          </a:p>
+        </p:txBody>
+      </p:sp>
+      <p:sp>
+        <p:nvSpPr>
+          <p:cNvPr id="4" name="Rectangle 3"/>
+          <p:cNvSpPr/>
+          <p:nvPr/>
+        </p:nvSpPr>
+        <p:spPr>
+          <a:xfrm>
+            <a:off x="576105" y="1218858"/>
+            <a:ext cx="4014952" cy="1647682"/>
+          </a:xfrm>
+          <a:prstGeom prst="rect">
+            <a:avLst/>
+          </a:prstGeom>
+          <a:solidFill>
+            <a:srgbClr val="808080">
+              <a:alpha val="34902"/>
+            </a:srgbClr>
+          </a:solidFill>
+        </p:spPr>
+        <p:style>
+          <a:lnRef idx="2">
+            <a:schemeClr val="accent1">
+              <a:shade val="50000"/>
+            </a:schemeClr>
+          </a:lnRef>
+          <a:fillRef idx="1">
+            <a:schemeClr val="accent1"/>
+          </a:fillRef>
+          <a:effectRef idx="0">
+            <a:schemeClr val="accent1"/>
+          </a:effectRef>
+          <a:fontRef idx="minor">
+            <a:schemeClr val="lt1"/>
+          </a:fontRef>
+        </p:style>
+        <p:txBody>
+          <a:bodyPr rtlCol="0" anchor="ctr"/>
+          <a:lstStyle/>
+          <a:p>
+            <a:pPr algn="ctr"/>
+            <a:endParaRPr lang="en-US" dirty="0" smtClean="0"/>
+          </a:p>
+          <a:p>
+            <a:pPr algn="ctr"/>
+            <a:endParaRPr lang="en-US" dirty="0"/>
+          </a:p>
+          <a:p>
+            <a:pPr algn="ctr"/>
+            <a:endParaRPr lang="en-US" dirty="0" smtClean="0"/>
+          </a:p>
+          <a:p>
+            <a:pPr algn="ctr"/>
+            <a:endParaRPr lang="en-US" dirty="0"/>
+          </a:p>
+          <a:p>
+            <a:pPr algn="ctr"/>
+            <a:endParaRPr lang="en-US" dirty="0" smtClean="0"/>
+          </a:p>
+          <a:p>
+            <a:pPr algn="ctr"/>
+            <a:endParaRPr lang="en-US" dirty="0"/>
+          </a:p>
+          <a:p>
+            <a:pPr algn="ctr"/>
+            <a:r>
+              <a:rPr lang="en-US" dirty="0" smtClean="0">
+                <a:ln w="0"/>
+                <a:solidFill>
+                  <a:schemeClr val="tx1"/>
+                </a:solidFill>
+                <a:effectLst>
+                  <a:outerShdw blurRad="38100" dist="19050" dir="2700000" algn="tl" rotWithShape="0">
+                    <a:schemeClr val="dk1">
+                      <a:alpha val="40000"/>
+                    </a:schemeClr>
+                  </a:outerShdw>
+                </a:effectLst>
+              </a:rPr>
+              <a:t>Week 1 – Week 4</a:t>
+            </a:r>
+            <a:endParaRPr lang="en-US" dirty="0">
+              <a:ln w="0"/>
+              <a:solidFill>
+                <a:schemeClr val="tx1"/>
+              </a:solidFill>
+              <a:effectLst>
+                <a:outerShdw blurRad="38100" dist="19050" dir="2700000" algn="tl" rotWithShape="0">
+                  <a:schemeClr val="dk1">
+                    <a:alpha val="40000"/>
+                  </a:schemeClr>
+                </a:outerShdw>
+              </a:effectLst>
+            </a:endParaRPr>
+          </a:p>
+        </p:txBody>
+      </p:sp>
+      <p:sp>
+        <p:nvSpPr>
+          <p:cNvPr id="12" name="Rectangle 11"/>
+          <p:cNvSpPr/>
+          <p:nvPr/>
+        </p:nvSpPr>
+        <p:spPr>
+          <a:xfrm>
+            <a:off x="5199169" y="2695014"/>
+            <a:ext cx="3821987" cy="1899770"/>
+          </a:xfrm>
+          <a:prstGeom prst="rect">
+            <a:avLst/>
+          </a:prstGeom>
+          <a:solidFill>
+            <a:srgbClr val="808080">
+              <a:alpha val="34902"/>
+            </a:srgbClr>
+          </a:solidFill>
+        </p:spPr>
+        <p:style>
+          <a:lnRef idx="2">
+            <a:schemeClr val="accent1">
+              <a:shade val="50000"/>
+            </a:schemeClr>
+          </a:lnRef>
+          <a:fillRef idx="1">
+            <a:schemeClr val="accent1"/>
+          </a:fillRef>
+          <a:effectRef idx="0">
+            <a:schemeClr val="accent1"/>
+          </a:effectRef>
+          <a:fontRef idx="minor">
+            <a:schemeClr val="lt1"/>
+          </a:fontRef>
+        </p:style>
+        <p:txBody>
+          <a:bodyPr rtlCol="0" anchor="ctr"/>
+          <a:lstStyle/>
+          <a:p>
+            <a:pPr algn="ctr"/>
+            <a:endParaRPr lang="en-US" dirty="0"/>
+          </a:p>
+          <a:p>
+            <a:pPr algn="ctr"/>
+            <a:endParaRPr lang="en-US" dirty="0"/>
+          </a:p>
+          <a:p>
+            <a:pPr algn="ctr"/>
+            <a:endParaRPr lang="en-US" dirty="0"/>
+          </a:p>
+          <a:p>
+            <a:pPr algn="ctr"/>
+            <a:endParaRPr lang="en-US" dirty="0"/>
+          </a:p>
+          <a:p>
+            <a:pPr algn="ctr"/>
+            <a:endParaRPr lang="en-US" dirty="0"/>
+          </a:p>
+          <a:p>
+            <a:pPr algn="ctr"/>
+            <a:endParaRPr lang="en-US" dirty="0"/>
+          </a:p>
+          <a:p>
+            <a:pPr algn="ctr"/>
+            <a:endParaRPr lang="en-US" dirty="0"/>
+          </a:p>
+          <a:p>
+            <a:pPr algn="ctr"/>
+            <a:r>
+              <a:rPr lang="en-US" dirty="0">
+                <a:ln w="0"/>
+                <a:solidFill>
+                  <a:schemeClr val="tx1"/>
+                </a:solidFill>
+                <a:effectLst>
+                  <a:outerShdw blurRad="38100" dist="19050" dir="2700000" algn="tl" rotWithShape="0">
+                    <a:schemeClr val="dk1">
+                      <a:alpha val="40000"/>
+                    </a:schemeClr>
+                  </a:outerShdw>
+                </a:effectLst>
+              </a:rPr>
+              <a:t>Week 5 – Week 8</a:t>
+            </a:r>
+          </a:p>
+        </p:txBody>
+      </p:sp>
+      <p:sp>
+        <p:nvSpPr>
+          <p:cNvPr id="14" name="Bent Arrow 13"/>
+          <p:cNvSpPr/>
+          <p:nvPr/>
+        </p:nvSpPr>
+        <p:spPr>
+          <a:xfrm flipV="1">
+            <a:off x="3016468" y="2866540"/>
+            <a:ext cx="2182701" cy="1232494"/>
+          </a:xfrm>
+          <a:prstGeom prst="bentArrow">
+            <a:avLst/>
+          </a:prstGeom>
+        </p:spPr>
+        <p:style>
+          <a:lnRef idx="2">
+            <a:schemeClr val="accent1">
+              <a:shade val="50000"/>
+            </a:schemeClr>
+          </a:lnRef>
+          <a:fillRef idx="1">
+            <a:schemeClr val="accent1"/>
+          </a:fillRef>
+          <a:effectRef idx="0">
+            <a:schemeClr val="accent1"/>
+          </a:effectRef>
+          <a:fontRef idx="minor">
+            <a:schemeClr val="lt1"/>
+          </a:fontRef>
+        </p:style>
+        <p:txBody>
+          <a:bodyPr rtlCol="0" anchor="ctr"/>
+          <a:lstStyle/>
+          <a:p>
+            <a:pPr algn="ctr"/>
+            <a:endParaRPr lang="en-US" dirty="0">
+              <a:solidFill>
+                <a:schemeClr val="tx1"/>
+              </a:solidFill>
+            </a:endParaRPr>
+          </a:p>
+        </p:txBody>
+      </p:sp>
+      <p:sp>
+        <p:nvSpPr>
+          <p:cNvPr id="15" name="TextBox 14"/>
+          <p:cNvSpPr txBox="1"/>
+          <p:nvPr/>
+        </p:nvSpPr>
+        <p:spPr>
+          <a:xfrm flipH="1">
+            <a:off x="3650446" y="3667612"/>
+            <a:ext cx="1338682" cy="307777"/>
+          </a:xfrm>
+          <a:prstGeom prst="rect">
+            <a:avLst/>
+          </a:prstGeom>
+          <a:noFill/>
+        </p:spPr>
+        <p:txBody>
+          <a:bodyPr wrap="square" rtlCol="0">
+            <a:spAutoFit/>
+          </a:bodyPr>
+          <a:lstStyle/>
+          <a:p>
+            <a:r>
+              <a:rPr lang="en-US" dirty="0" smtClean="0"/>
+              <a:t>Milestone</a:t>
+            </a:r>
+            <a:endParaRPr lang="en-US" dirty="0"/>
           </a:p>
         </p:txBody>
       </p:sp>
@@ -10858,7 +11154,34 @@
                 <a:latin typeface="Times New Roman" panose="02020603050405020304" pitchFamily="18" charset="0"/>
                 <a:cs typeface="Times New Roman" panose="02020603050405020304" pitchFamily="18" charset="0"/>
               </a:rPr>
-              <a:t>Modules and its core Functionalities</a:t>
+              <a:t>Modules and its core </a:t>
+            </a:r>
+            <a:r>
+              <a:rPr lang="en" sz="2000" dirty="0" smtClean="0">
+                <a:solidFill>
+                  <a:schemeClr val="accent6">
+                    <a:lumMod val="50000"/>
+                  </a:schemeClr>
+                </a:solidFill>
+                <a:latin typeface="Times New Roman" panose="02020603050405020304" pitchFamily="18" charset="0"/>
+                <a:cs typeface="Times New Roman" panose="02020603050405020304" pitchFamily="18" charset="0"/>
+              </a:rPr>
+              <a:t>Functionalities</a:t>
+            </a:r>
+          </a:p>
+          <a:p>
+            <a:pPr marL="571500" indent="-342900"/>
+            <a:r>
+              <a:rPr lang="en" sz="2000" dirty="0" smtClean="0">
+                <a:solidFill>
+                  <a:schemeClr val="accent6">
+                    <a:lumMod val="50000"/>
+                  </a:schemeClr>
+                </a:solidFill>
+                <a:latin typeface="Times New Roman" panose="02020603050405020304" pitchFamily="18" charset="0"/>
+                <a:cs typeface="Times New Roman" panose="02020603050405020304" pitchFamily="18" charset="0"/>
+              </a:rPr>
+              <a:t>Tasks – Completed, In Progress</a:t>
             </a:r>
           </a:p>
           <a:p>
@@ -10880,21 +11203,6 @@
             <a:pPr marL="571500" indent="-342900"/>
             <a:r>
               <a:rPr lang="en" sz="2000" dirty="0" smtClean="0">
-                <a:solidFill>
-                  <a:schemeClr val="accent6">
-                    <a:lumMod val="50000"/>
-                  </a:schemeClr>
-                </a:solidFill>
-                <a:latin typeface="Times New Roman" panose="02020603050405020304" pitchFamily="18" charset="0"/>
-                <a:cs typeface="Times New Roman" panose="02020603050405020304" pitchFamily="18" charset="0"/>
-              </a:rPr>
-              <a:t>Requirements</a:t>
-            </a:r>
-          </a:p>
-          <a:p>
-            <a:pPr marL="571500" indent="-342900"/>
-            <a:r>
-              <a:rPr lang="en" sz="2000" dirty="0">
                 <a:solidFill>
                   <a:schemeClr val="accent6">
                     <a:lumMod val="50000"/>
@@ -11455,19 +11763,7 @@
               <a:rPr lang="en-US" sz="3200" b="1" dirty="0" smtClean="0">
                 <a:latin typeface="Calisto MT" panose="02040603050505030304" pitchFamily="18" charset="0"/>
               </a:rPr>
-              <a:t>Requirements                      (</a:t>
-            </a:r>
-            <a:r>
-              <a:rPr lang="en-US" sz="3200" b="1" dirty="0" err="1" smtClean="0">
-                <a:latin typeface="Calisto MT" panose="02040603050505030304" pitchFamily="18" charset="0"/>
-              </a:rPr>
-              <a:t>Cntd</a:t>
-            </a:r>
-            <a:r>
-              <a:rPr lang="en-US" sz="3200" b="1" dirty="0" smtClean="0">
-                <a:latin typeface="Calisto MT" panose="02040603050505030304" pitchFamily="18" charset="0"/>
-              </a:rPr>
-              <a:t>…)</a:t>
+              <a:t>Tasks - Completed</a:t>
             </a:r>
             <a:endParaRPr lang="en-US" sz="3200" b="1" dirty="0">
               <a:latin typeface="Calisto MT" panose="02040603050505030304" pitchFamily="18" charset="0"/>
@@ -11883,7 +12179,7 @@
               <a:rPr lang="en-US" sz="3200" b="1" dirty="0" smtClean="0">
                 <a:latin typeface="Calisto MT" panose="02040603050505030304" pitchFamily="18" charset="0"/>
               </a:rPr>
-              <a:t>Requirements</a:t>
+              <a:t>Tasks - In progress</a:t>
             </a:r>
             <a:endParaRPr lang="en-US" sz="3200" b="1" dirty="0">
               <a:latin typeface="Calisto MT" panose="02040603050505030304" pitchFamily="18" charset="0"/>

</xml_diff>